<commit_message>
chore: add QA documentation
</commit_message>
<xml_diff>
--- a/documents/MOPS - presentation.pptx
+++ b/documents/MOPS - presentation.pptx
@@ -19,16 +19,16 @@
   <p:notesSz cx="6858000" cy="9144000"/>
   <p:embeddedFontLst>
     <p:embeddedFont>
-      <p:font typeface="Fjalla One" panose="02000506040000020004" pitchFamily="2" charset="0"/>
+      <p:font typeface="Lexend Deca" panose="020B0604020202020204" charset="0"/>
       <p:regular r:id="rId9"/>
+      <p:bold r:id="rId10"/>
     </p:embeddedFont>
     <p:embeddedFont>
-      <p:font typeface="Lexend Deca" panose="020B0604020202020204" charset="0"/>
-      <p:regular r:id="rId10"/>
-      <p:bold r:id="rId11"/>
+      <p:font typeface="Fjalla One" panose="020B0604020202020204" charset="0"/>
+      <p:regular r:id="rId11"/>
     </p:embeddedFont>
     <p:embeddedFont>
-      <p:font typeface="Roboto" panose="02000000000000000000" pitchFamily="2" charset="0"/>
+      <p:font typeface="Roboto" panose="020B0604020202020204" charset="0"/>
       <p:regular r:id="rId12"/>
       <p:bold r:id="rId13"/>
       <p:italic r:id="rId14"/>
@@ -11958,7 +11958,15 @@
             <a:pPr marL="0" lvl="0" indent="0"/>
             <a:r>
               <a:rPr lang="de-DE" dirty="0"/>
-              <a:t>Chemistry &amp; Biology Project</a:t>
+              <a:t>Chemistry &amp; </a:t>
+            </a:r>
+            <a:r>
+              <a:rPr lang="de-DE"/>
+              <a:t>Biology </a:t>
+            </a:r>
+            <a:r>
+              <a:rPr lang="de-DE" smtClean="0"/>
+              <a:t>Project</a:t>
             </a:r>
             <a:endParaRPr dirty="0"/>
           </a:p>

</xml_diff>